<commit_message>
Abhinav/Naz Updated the repo links.
</commit_message>
<xml_diff>
--- a/Day 3/day_3.pptx
+++ b/Day 3/day_3.pptx
@@ -205,7 +205,7 @@
           <a:p>
             <a:fld id="{3B523C2C-A741-4C4A-9A60-997C0778C513}" type="datetimeFigureOut">
               <a:rPr lang="en-US" smtClean="0"/>
-              <a:t>20/02/14</a:t>
+              <a:t>07/03/14</a:t>
             </a:fld>
             <a:endParaRPr lang="en-US"/>
           </a:p>
@@ -757,7 +757,7 @@
           <a:p>
             <a:fld id="{A4A6734C-E115-4BC5-9FB0-F9BF6FABFDA0}" type="datetimeFigureOut">
               <a:rPr lang="en-US" smtClean="0"/>
-              <a:t>20/02/14</a:t>
+              <a:t>07/03/14</a:t>
             </a:fld>
             <a:endParaRPr lang="en-US"/>
           </a:p>
@@ -1009,7 +1009,7 @@
           <a:p>
             <a:fld id="{A4A6734C-E115-4BC5-9FB0-F9BF6FABFDA0}" type="datetimeFigureOut">
               <a:rPr lang="en-US" smtClean="0"/>
-              <a:t>20/02/14</a:t>
+              <a:t>07/03/14</a:t>
             </a:fld>
             <a:endParaRPr lang="en-US"/>
           </a:p>
@@ -1408,7 +1408,7 @@
           <a:p>
             <a:fld id="{A4A6734C-E115-4BC5-9FB0-F9BF6FABFDA0}" type="datetimeFigureOut">
               <a:rPr lang="en-US" smtClean="0"/>
-              <a:t>20/02/14</a:t>
+              <a:t>07/03/14</a:t>
             </a:fld>
             <a:endParaRPr lang="en-US"/>
           </a:p>
@@ -1807,7 +1807,7 @@
           <a:p>
             <a:fld id="{A4A6734C-E115-4BC5-9FB0-F9BF6FABFDA0}" type="datetimeFigureOut">
               <a:rPr lang="en-US" smtClean="0"/>
-              <a:t>20/02/14</a:t>
+              <a:t>07/03/14</a:t>
             </a:fld>
             <a:endParaRPr lang="en-US"/>
           </a:p>
@@ -2260,7 +2260,7 @@
           <a:p>
             <a:fld id="{A4A6734C-E115-4BC5-9FB0-F9BF6FABFDA0}" type="datetimeFigureOut">
               <a:rPr lang="en-US" smtClean="0"/>
-              <a:t>20/02/14</a:t>
+              <a:t>07/03/14</a:t>
             </a:fld>
             <a:endParaRPr lang="en-US"/>
           </a:p>
@@ -2815,7 +2815,7 @@
           <a:p>
             <a:fld id="{A4A6734C-E115-4BC5-9FB0-F9BF6FABFDA0}" type="datetimeFigureOut">
               <a:rPr lang="en-US" smtClean="0"/>
-              <a:t>20/02/14</a:t>
+              <a:t>07/03/14</a:t>
             </a:fld>
             <a:endParaRPr lang="en-US"/>
           </a:p>
@@ -3504,7 +3504,7 @@
           <a:p>
             <a:fld id="{A4A6734C-E115-4BC5-9FB0-F9BF6FABFDA0}" type="datetimeFigureOut">
               <a:rPr lang="en-US" smtClean="0"/>
-              <a:t>20/02/14</a:t>
+              <a:t>07/03/14</a:t>
             </a:fld>
             <a:endParaRPr lang="en-US"/>
           </a:p>
@@ -3718,7 +3718,7 @@
           <a:p>
             <a:fld id="{A4A6734C-E115-4BC5-9FB0-F9BF6FABFDA0}" type="datetimeFigureOut">
               <a:rPr lang="en-US" smtClean="0"/>
-              <a:t>20/02/14</a:t>
+              <a:t>07/03/14</a:t>
             </a:fld>
             <a:endParaRPr lang="en-US"/>
           </a:p>
@@ -3918,7 +3918,7 @@
           <a:p>
             <a:fld id="{A4A6734C-E115-4BC5-9FB0-F9BF6FABFDA0}" type="datetimeFigureOut">
               <a:rPr lang="en-US" smtClean="0"/>
-              <a:t>20/02/14</a:t>
+              <a:t>07/03/14</a:t>
             </a:fld>
             <a:endParaRPr lang="en-US"/>
           </a:p>
@@ -4221,7 +4221,7 @@
           <a:p>
             <a:fld id="{A4A6734C-E115-4BC5-9FB0-F9BF6FABFDA0}" type="datetimeFigureOut">
               <a:rPr lang="en-US" smtClean="0"/>
-              <a:t>20/02/14</a:t>
+              <a:t>07/03/14</a:t>
             </a:fld>
             <a:endParaRPr lang="en-US"/>
           </a:p>
@@ -4842,7 +4842,7 @@
           <a:p>
             <a:fld id="{A4A6734C-E115-4BC5-9FB0-F9BF6FABFDA0}" type="datetimeFigureOut">
               <a:rPr lang="en-US" smtClean="0"/>
-              <a:t>20/02/14</a:t>
+              <a:t>07/03/14</a:t>
             </a:fld>
             <a:endParaRPr lang="en-US"/>
           </a:p>
@@ -5171,7 +5171,7 @@
           <a:p>
             <a:fld id="{A4A6734C-E115-4BC5-9FB0-F9BF6FABFDA0}" type="datetimeFigureOut">
               <a:rPr lang="en-US" smtClean="0"/>
-              <a:t>20/02/14</a:t>
+              <a:t>07/03/14</a:t>
             </a:fld>
             <a:endParaRPr lang="en-US"/>
           </a:p>
@@ -5644,7 +5644,7 @@
           <a:p>
             <a:fld id="{A4A6734C-E115-4BC5-9FB0-F9BF6FABFDA0}" type="datetimeFigureOut">
               <a:rPr lang="en-US" smtClean="0"/>
-              <a:t>20/02/14</a:t>
+              <a:t>07/03/14</a:t>
             </a:fld>
             <a:endParaRPr lang="en-US"/>
           </a:p>
@@ -5788,7 +5788,7 @@
           <a:p>
             <a:fld id="{A4A6734C-E115-4BC5-9FB0-F9BF6FABFDA0}" type="datetimeFigureOut">
               <a:rPr lang="en-US" smtClean="0"/>
-              <a:t>20/02/14</a:t>
+              <a:t>07/03/14</a:t>
             </a:fld>
             <a:endParaRPr lang="en-US"/>
           </a:p>
@@ -5878,7 +5878,7 @@
           <a:p>
             <a:fld id="{A4A6734C-E115-4BC5-9FB0-F9BF6FABFDA0}" type="datetimeFigureOut">
               <a:rPr lang="en-US" smtClean="0"/>
-              <a:t>20/02/14</a:t>
+              <a:t>07/03/14</a:t>
             </a:fld>
             <a:endParaRPr lang="en-US"/>
           </a:p>
@@ -6159,7 +6159,7 @@
           <a:p>
             <a:fld id="{A4A6734C-E115-4BC5-9FB0-F9BF6FABFDA0}" type="datetimeFigureOut">
               <a:rPr lang="en-US" smtClean="0"/>
-              <a:t>20/02/14</a:t>
+              <a:t>07/03/14</a:t>
             </a:fld>
             <a:endParaRPr lang="en-US"/>
           </a:p>
@@ -6455,7 +6455,7 @@
           <a:p>
             <a:fld id="{A4A6734C-E115-4BC5-9FB0-F9BF6FABFDA0}" type="datetimeFigureOut">
               <a:rPr lang="en-US" smtClean="0"/>
-              <a:t>20/02/14</a:t>
+              <a:t>07/03/14</a:t>
             </a:fld>
             <a:endParaRPr lang="en-US"/>
           </a:p>
@@ -8039,18 +8039,37 @@
               <a:t> app from </a:t>
             </a:r>
             <a:r>
-              <a:rPr lang="en-US" sz="2800" dirty="0">
+              <a:rPr lang="fr-FR" sz="2800" dirty="0">
                 <a:hlinkClick r:id="rId2"/>
               </a:rPr>
-              <a:t>github.com/NazneenRupawalla/Android-Bootcamp-</a:t>
-            </a:r>
-            <a:r>
-              <a:rPr lang="en-US" sz="2800" dirty="0" smtClean="0">
+              <a:t>https://github.com/androidbootcamp/Android-Bootcamp-</a:t>
+            </a:r>
+            <a:r>
+              <a:rPr lang="fr-FR" sz="2800" dirty="0" smtClean="0">
                 <a:hlinkClick r:id="rId2"/>
               </a:rPr>
               <a:t>V1.1</a:t>
             </a:r>
-            <a:endParaRPr lang="en-US" sz="2800" dirty="0"/>
+            <a:r>
+              <a:rPr lang="fr-FR" sz="2800" dirty="0" smtClean="0"/>
+              <a:t> and </a:t>
+            </a:r>
+            <a:r>
+              <a:rPr lang="fr-FR" sz="2800" dirty="0" err="1" smtClean="0"/>
+              <a:t>checkout</a:t>
+            </a:r>
+            <a:r>
+              <a:rPr lang="fr-FR" sz="2800" dirty="0" smtClean="0"/>
+              <a:t> Day_3 </a:t>
+            </a:r>
+            <a:r>
+              <a:rPr lang="fr-FR" sz="2800" dirty="0" err="1" smtClean="0"/>
+              <a:t>branch</a:t>
+            </a:r>
+            <a:r>
+              <a:rPr lang="fr-FR" sz="2800" dirty="0" smtClean="0"/>
+              <a:t>.</a:t>
+            </a:r>
           </a:p>
           <a:p>
             <a:pPr>
@@ -8058,7 +8077,7 @@
               <a:buChar char=""/>
             </a:pPr>
             <a:r>
-              <a:rPr lang="en-US" sz="2800" dirty="0">
+              <a:rPr lang="en-US" sz="2800" dirty="0" smtClean="0">
                 <a:solidFill>
                   <a:srgbClr val="000000"/>
                 </a:solidFill>

</xml_diff>